<commit_message>
Create week-02 dir and first exercise
</commit_message>
<xml_diff>
--- a/week-01/1st-demo.pptx
+++ b/week-01/1st-demo.pptx
@@ -108,6 +108,11 @@
       </a:defRPr>
     </a:lvl9pPr>
   </p:defaultTextStyle>
+  <p:extLst>
+    <p:ext uri="{EFAFB233-063F-42B5-8137-9DF3F51BA10A}">
+      <p15:sldGuideLst xmlns:p15="http://schemas.microsoft.com/office/powerpoint/2012/main"/>
+    </p:ext>
+  </p:extLst>
 </p:presentation>
 </file>
 
@@ -3811,10 +3816,10 @@
           <a:lstStyle/>
           <a:p>
             <a:r>
-              <a:rPr lang="en-US" dirty="0" smtClean="0"/>
+              <a:rPr lang="en-US" sz="8800" b="1" dirty="0" smtClean="0"/>
               <a:t>Week 1-DEMO</a:t>
             </a:r>
-            <a:endParaRPr lang="en-US" dirty="0"/>
+            <a:endParaRPr lang="en-US" sz="8800" b="1" dirty="0"/>
           </a:p>
         </p:txBody>
       </p:sp>
@@ -3830,14 +3835,16 @@
         </p:nvSpPr>
         <p:spPr/>
         <p:txBody>
-          <a:bodyPr/>
+          <a:bodyPr>
+            <a:noAutofit/>
+          </a:bodyPr>
           <a:lstStyle/>
           <a:p>
             <a:r>
-              <a:rPr lang="en-US" dirty="0" smtClean="0"/>
+              <a:rPr lang="en-US" sz="8000" dirty="0" smtClean="0"/>
               <a:t>Annie</a:t>
             </a:r>
-            <a:endParaRPr lang="en-US" dirty="0"/>
+            <a:endParaRPr lang="en-US" sz="8000" dirty="0"/>
           </a:p>
         </p:txBody>
       </p:sp>

</xml_diff>